<commit_message>
Add pdf YAPC 2015
</commit_message>
<xml_diff>
--- a/09:2015 - YAPC /Omnia in 20 minutes.pptx
+++ b/09:2015 - YAPC /Omnia in 20 minutes.pptx
@@ -155,7 +155,7 @@
   </p:defaultTextStyle>
   <p:extLst>
     <p:ext uri="{EFAFB233-063F-42B5-8137-9DF3F51BA10A}">
-      <p15:sldGuideLst xmlns:p15="http://schemas.microsoft.com/office/powerpoint/2012/main" xmlns="">
+      <p15:sldGuideLst xmlns="" xmlns:p15="http://schemas.microsoft.com/office/powerpoint/2012/main">
         <p15:guide id="1" orient="horz" pos="2160">
           <p15:clr>
             <a:srgbClr val="A4A3A4"/>
@@ -255,7 +255,7 @@
             <a:fld id="{8CF2A0F1-5F4B-49D7-BC9F-3A56518856A2}" type="datetimeFigureOut">
               <a:rPr lang="en-GB" smtClean="0"/>
               <a:pPr/>
-              <a:t>01/09/15</a:t>
+              <a:t>04/09/15</a:t>
             </a:fld>
             <a:endParaRPr lang="en-GB" dirty="0"/>
           </a:p>
@@ -446,7 +446,7 @@
               <a:pPr>
                 <a:defRPr/>
               </a:pPr>
-              <a:t>01/09/15</a:t>
+              <a:t>04/09/15</a:t>
             </a:fld>
             <a:endParaRPr lang="en-GB" dirty="0"/>
           </a:p>
@@ -7687,7 +7687,20 @@
                 <a:latin typeface="Helvetica"/>
                 <a:cs typeface="Helvetica"/>
               </a:rPr>
-              <a:t>based on demand, </a:t>
+              <a:t>based on </a:t>
+            </a:r>
+            <a:r>
+              <a:rPr lang="en-US" sz="1600" dirty="0" smtClean="0">
+                <a:solidFill>
+                  <a:schemeClr val="tx2">
+                    <a:lumMod val="90000"/>
+                    <a:lumOff val="10000"/>
+                  </a:schemeClr>
+                </a:solidFill>
+                <a:latin typeface="Helvetica"/>
+                <a:cs typeface="Helvetica"/>
+              </a:rPr>
+              <a:t>demand </a:t>
             </a:r>
             <a:endParaRPr lang="en-US" sz="1600" dirty="0" smtClean="0">
               <a:solidFill>
@@ -11795,7 +11808,7 @@
         </p:nvSpPr>
         <p:spPr>
           <a:xfrm>
-            <a:off x="4860032" y="4509120"/>
+            <a:off x="4788024" y="4365104"/>
             <a:ext cx="4464496" cy="432048"/>
           </a:xfrm>
         </p:spPr>
@@ -12089,7 +12102,7 @@
         </p:nvSpPr>
         <p:spPr bwMode="auto">
           <a:xfrm>
-            <a:off x="4860032" y="5013176"/>
+            <a:off x="4860032" y="4293096"/>
             <a:ext cx="3960440" cy="432048"/>
           </a:xfrm>
           <a:prstGeom prst="rect">
@@ -12261,51 +12274,6 @@
               </a:defRPr>
             </a:lvl9pPr>
           </a:lstStyle>
-          <a:p>
-            <a:pPr marL="0" indent="0">
-              <a:buFont typeface="Arial" pitchFamily="34" charset="0"/>
-              <a:buNone/>
-            </a:pPr>
-            <a:r>
-              <a:rPr lang="en-US" sz="2100" dirty="0" smtClean="0">
-                <a:solidFill>
-                  <a:schemeClr val="tx2">
-                    <a:lumMod val="90000"/>
-                    <a:lumOff val="10000"/>
-                  </a:schemeClr>
-                </a:solidFill>
-                <a:latin typeface="Helvetica"/>
-                <a:cs typeface="Helvetica"/>
-              </a:rPr>
-              <a:t>https://</a:t>
-            </a:r>
-            <a:r>
-              <a:rPr lang="en-US" sz="2100" dirty="0" err="1" smtClean="0">
-                <a:solidFill>
-                  <a:schemeClr val="tx2">
-                    <a:lumMod val="90000"/>
-                    <a:lumOff val="10000"/>
-                  </a:schemeClr>
-                </a:solidFill>
-                <a:latin typeface="Helvetica"/>
-                <a:cs typeface="Helvetica"/>
-              </a:rPr>
-              <a:t>omnia.williamhill.com</a:t>
-            </a:r>
-            <a:r>
-              <a:rPr lang="en-US" sz="2100" dirty="0" smtClean="0">
-                <a:solidFill>
-                  <a:schemeClr val="tx2">
-                    <a:lumMod val="90000"/>
-                    <a:lumOff val="10000"/>
-                  </a:schemeClr>
-                </a:solidFill>
-                <a:latin typeface="Helvetica"/>
-                <a:cs typeface="Helvetica"/>
-              </a:rPr>
-              <a:t>/</a:t>
-            </a:r>
-          </a:p>
           <a:p>
             <a:pPr marL="0" indent="0">
               <a:buFont typeface="Arial" pitchFamily="34" charset="0"/>
@@ -12354,6 +12322,36 @@
           </a:prstGeom>
         </p:spPr>
       </p:pic>
+      <p:sp>
+        <p:nvSpPr>
+          <p:cNvPr id="4" name="TextBox 3"/>
+          <p:cNvSpPr txBox="1"/>
+          <p:nvPr/>
+        </p:nvSpPr>
+        <p:spPr>
+          <a:xfrm>
+            <a:off x="3635896" y="5229200"/>
+            <a:ext cx="5240099" cy="369332"/>
+          </a:xfrm>
+          <a:prstGeom prst="rect">
+            <a:avLst/>
+          </a:prstGeom>
+          <a:noFill/>
+        </p:spPr>
+        <p:txBody>
+          <a:bodyPr wrap="none" rtlCol="0">
+            <a:spAutoFit/>
+          </a:bodyPr>
+          <a:lstStyle/>
+          <a:p>
+            <a:r>
+              <a:rPr lang="en-US" dirty="0" smtClean="0"/>
+              <a:t>Omnia will be released as an open source project</a:t>
+            </a:r>
+            <a:endParaRPr lang="en-US" dirty="0"/>
+          </a:p>
+        </p:txBody>
+      </p:sp>
     </p:spTree>
     <p:extLst>
       <p:ext uri="{BB962C8B-B14F-4D97-AF65-F5344CB8AC3E}">
@@ -15450,7 +15448,7 @@
         </p:nvSpPr>
         <p:spPr>
           <a:xfrm>
-            <a:off x="4860032" y="1916832"/>
+            <a:off x="4932040" y="2348880"/>
             <a:ext cx="3816424" cy="2232248"/>
           </a:xfrm>
         </p:spPr>
@@ -15476,7 +15474,7 @@
           </a:p>
           <a:p>
             <a:r>
-              <a:rPr lang="en-US" sz="1400" dirty="0">
+              <a:rPr lang="en-US" sz="1400" dirty="0" smtClean="0">
                 <a:solidFill>
                   <a:schemeClr val="accent1">
                     <a:lumMod val="90000"/>
@@ -15484,7 +15482,18 @@
                   </a:schemeClr>
                 </a:solidFill>
               </a:rPr>
-              <a:t>Reactive Extension for Perl: </a:t>
+              <a:t>Reactive </a:t>
+            </a:r>
+            <a:r>
+              <a:rPr lang="en-US" sz="1400" dirty="0">
+                <a:solidFill>
+                  <a:schemeClr val="accent1">
+                    <a:lumMod val="90000"/>
+                    <a:lumOff val="10000"/>
+                  </a:schemeClr>
+                </a:solidFill>
+              </a:rPr>
+              <a:t>Extension for Perl: </a:t>
             </a:r>
             <a:r>
               <a:rPr lang="en-US" sz="1400" dirty="0">
@@ -15620,79 +15629,6 @@
               </a:rPr>
               <a:t> </a:t>
             </a:r>
-          </a:p>
-          <a:p>
-            <a:r>
-              <a:rPr lang="en-US" sz="1400" dirty="0" smtClean="0">
-                <a:solidFill>
-                  <a:schemeClr val="accent1">
-                    <a:lumMod val="90000"/>
-                    <a:lumOff val="10000"/>
-                  </a:schemeClr>
-                </a:solidFill>
-                <a:latin typeface="+mn-lt"/>
-              </a:rPr>
-              <a:t>Ran </a:t>
-            </a:r>
-            <a:r>
-              <a:rPr lang="en-US" sz="1400" dirty="0" err="1" smtClean="0">
-                <a:solidFill>
-                  <a:schemeClr val="accent1">
-                    <a:lumMod val="90000"/>
-                    <a:lumOff val="10000"/>
-                  </a:schemeClr>
-                </a:solidFill>
-                <a:latin typeface="+mn-lt"/>
-              </a:rPr>
-              <a:t>Eliam</a:t>
-            </a:r>
-            <a:r>
-              <a:rPr lang="en-US" sz="1400" dirty="0">
-                <a:solidFill>
-                  <a:schemeClr val="accent1">
-                    <a:lumMod val="90000"/>
-                    <a:lumOff val="10000"/>
-                  </a:schemeClr>
-                </a:solidFill>
-                <a:latin typeface="+mn-lt"/>
-              </a:rPr>
-              <a:t> : </a:t>
-            </a:r>
-            <a:r>
-              <a:rPr lang="en-US" sz="1400" dirty="0">
-                <a:solidFill>
-                  <a:schemeClr val="accent1">
-                    <a:lumMod val="90000"/>
-                    <a:lumOff val="10000"/>
-                  </a:schemeClr>
-                </a:solidFill>
-                <a:latin typeface="+mn-lt"/>
-                <a:hlinkClick r:id="rId4"/>
-              </a:rPr>
-              <a:t>https://www.youtube.com/watch?v=</a:t>
-            </a:r>
-            <a:r>
-              <a:rPr lang="en-US" sz="1400" dirty="0" smtClean="0">
-                <a:solidFill>
-                  <a:schemeClr val="accent1">
-                    <a:lumMod val="90000"/>
-                    <a:lumOff val="10000"/>
-                  </a:schemeClr>
-                </a:solidFill>
-                <a:latin typeface="+mn-lt"/>
-                <a:hlinkClick r:id="rId4"/>
-              </a:rPr>
-              <a:t>ymEGZEi4hO4</a:t>
-            </a:r>
-            <a:endParaRPr lang="en-US" sz="1400" dirty="0" smtClean="0">
-              <a:solidFill>
-                <a:schemeClr val="accent1">
-                  <a:lumMod val="90000"/>
-                  <a:lumOff val="10000"/>
-                </a:schemeClr>
-              </a:solidFill>
-              <a:latin typeface="+mn-lt"/>
-            </a:endParaRPr>
           </a:p>
           <a:p>
             <a:endParaRPr lang="en-US" sz="1400" dirty="0" smtClean="0">
@@ -15762,16 +15698,6 @@
               </a:rPr>
               <a:t>Reactive principles</a:t>
             </a:r>
-            <a:endParaRPr lang="en-GB" sz="4000" dirty="0" smtClean="0">
-              <a:solidFill>
-                <a:schemeClr val="accent1">
-                  <a:lumMod val="90000"/>
-                  <a:lumOff val="10000"/>
-                </a:schemeClr>
-              </a:solidFill>
-              <a:latin typeface="Helvetica"/>
-              <a:cs typeface="Helvetica"/>
-            </a:endParaRPr>
           </a:p>
         </p:txBody>
       </p:sp>
@@ -15817,7 +15743,7 @@
           <p:nvPr/>
         </p:nvPicPr>
         <p:blipFill>
-          <a:blip r:embed="rId5">
+          <a:blip r:embed="rId4">
             <a:extLst>
               <a:ext uri="{28A0092B-C50C-407E-A947-70E740481C1C}">
                 <a14:useLocalDpi xmlns:a14="http://schemas.microsoft.com/office/drawing/2010/main" val="0"/>
@@ -16233,13 +16159,13 @@
           <a:p>
             <a:r>
               <a:rPr lang="en-US" sz="1400" dirty="0">
-                <a:hlinkClick r:id="rId6"/>
+                <a:hlinkClick r:id="rId5"/>
               </a:rPr>
               <a:t>http://www.reactivemanifesto.org</a:t>
             </a:r>
             <a:r>
               <a:rPr lang="en-US" sz="1400" dirty="0" smtClean="0">
-                <a:hlinkClick r:id="rId6"/>
+                <a:hlinkClick r:id="rId5"/>
               </a:rPr>
               <a:t>/</a:t>
             </a:r>
@@ -16545,7 +16471,59 @@
                 <a:latin typeface="Helvetica"/>
                 <a:cs typeface="Helvetica"/>
               </a:rPr>
-              <a:t> of observable events. </a:t>
+              <a:t> </a:t>
+            </a:r>
+            <a:r>
+              <a:rPr lang="en-US" b="1" dirty="0" smtClean="0">
+                <a:solidFill>
+                  <a:schemeClr val="accent1">
+                    <a:lumMod val="90000"/>
+                    <a:lumOff val="10000"/>
+                  </a:schemeClr>
+                </a:solidFill>
+                <a:latin typeface="Helvetica"/>
+                <a:cs typeface="Helvetica"/>
+              </a:rPr>
+              <a:t>of</a:t>
+            </a:r>
+            <a:r>
+              <a:rPr lang="en-US" dirty="0" smtClean="0">
+                <a:solidFill>
+                  <a:schemeClr val="accent1">
+                    <a:lumMod val="90000"/>
+                    <a:lumOff val="10000"/>
+                  </a:schemeClr>
+                </a:solidFill>
+                <a:latin typeface="Helvetica"/>
+                <a:cs typeface="Helvetica"/>
+              </a:rPr>
+              <a:t> </a:t>
+            </a:r>
+            <a:r>
+              <a:rPr lang="en-US" b="1" dirty="0" smtClean="0">
+                <a:solidFill>
+                  <a:schemeClr val="accent1">
+                    <a:lumMod val="90000"/>
+                    <a:lumOff val="10000"/>
+                  </a:schemeClr>
+                </a:solidFill>
+                <a:latin typeface="Helvetica"/>
+                <a:cs typeface="Helvetica"/>
+              </a:rPr>
+              <a:t>observable incidents</a:t>
+            </a:r>
+            <a:r>
+              <a:rPr lang="en-US" dirty="0" smtClean="0">
+                <a:solidFill>
+                  <a:schemeClr val="accent1">
+                    <a:lumMod val="90000"/>
+                    <a:lumOff val="10000"/>
+                  </a:schemeClr>
+                </a:solidFill>
+                <a:latin typeface="Helvetica"/>
+                <a:cs typeface="Helvetica"/>
+              </a:rPr>
+              <a:t>. </a:t>
             </a:r>
           </a:p>
           <a:p>
@@ -16676,7 +16654,7 @@
         </p:nvSpPr>
         <p:spPr bwMode="auto">
           <a:xfrm>
-            <a:off x="4644008" y="3356992"/>
+            <a:off x="4644008" y="2204865"/>
             <a:ext cx="4248472" cy="2088231"/>
           </a:xfrm>
           <a:prstGeom prst="rect">
@@ -17335,8 +17313,8 @@
         </p:nvSpPr>
         <p:spPr>
           <a:xfrm rot="16200000">
-            <a:off x="1051627" y="3276965"/>
-            <a:ext cx="2952328" cy="952143"/>
+            <a:off x="1231647" y="3096946"/>
+            <a:ext cx="2592289" cy="952143"/>
           </a:xfrm>
           <a:prstGeom prst="roundRect">
             <a:avLst>
@@ -17406,237 +17384,13 @@
       </p:sp>
       <p:sp>
         <p:nvSpPr>
-          <p:cNvPr id="4" name="Notched Right Arrow 3"/>
-          <p:cNvSpPr/>
-          <p:nvPr/>
-        </p:nvSpPr>
-        <p:spPr>
-          <a:xfrm>
-            <a:off x="1187623" y="2492896"/>
-            <a:ext cx="792088" cy="288032"/>
-          </a:xfrm>
-          <a:prstGeom prst="notchedRightArrow">
-            <a:avLst/>
-          </a:prstGeom>
-        </p:spPr>
-        <p:style>
-          <a:lnRef idx="2">
-            <a:schemeClr val="dk1">
-              <a:shade val="50000"/>
-            </a:schemeClr>
-          </a:lnRef>
-          <a:fillRef idx="1">
-            <a:schemeClr val="dk1"/>
-          </a:fillRef>
-          <a:effectRef idx="0">
-            <a:schemeClr val="dk1"/>
-          </a:effectRef>
-          <a:fontRef idx="minor">
-            <a:schemeClr val="lt1"/>
-          </a:fontRef>
-        </p:style>
-        <p:txBody>
-          <a:bodyPr rtlCol="0" anchor="ctr"/>
-          <a:lstStyle/>
-          <a:p>
-            <a:pPr algn="ctr"/>
-            <a:endParaRPr lang="en-US"/>
-          </a:p>
-        </p:txBody>
-      </p:sp>
-      <p:sp>
-        <p:nvSpPr>
-          <p:cNvPr id="12" name="Notched Right Arrow 11"/>
-          <p:cNvSpPr/>
-          <p:nvPr/>
-        </p:nvSpPr>
-        <p:spPr>
-          <a:xfrm>
-            <a:off x="1187623" y="2852936"/>
-            <a:ext cx="792088" cy="288032"/>
-          </a:xfrm>
-          <a:prstGeom prst="notchedRightArrow">
-            <a:avLst/>
-          </a:prstGeom>
-        </p:spPr>
-        <p:style>
-          <a:lnRef idx="1">
-            <a:schemeClr val="dk1"/>
-          </a:lnRef>
-          <a:fillRef idx="3">
-            <a:schemeClr val="dk1"/>
-          </a:fillRef>
-          <a:effectRef idx="2">
-            <a:schemeClr val="dk1"/>
-          </a:effectRef>
-          <a:fontRef idx="minor">
-            <a:schemeClr val="lt1"/>
-          </a:fontRef>
-        </p:style>
-        <p:txBody>
-          <a:bodyPr rtlCol="0" anchor="ctr"/>
-          <a:lstStyle/>
-          <a:p>
-            <a:pPr algn="ctr"/>
-            <a:endParaRPr lang="en-US"/>
-          </a:p>
-        </p:txBody>
-      </p:sp>
-      <p:sp>
-        <p:nvSpPr>
-          <p:cNvPr id="13" name="Notched Right Arrow 12"/>
-          <p:cNvSpPr/>
-          <p:nvPr/>
-        </p:nvSpPr>
-        <p:spPr>
-          <a:xfrm>
-            <a:off x="1187623" y="3212976"/>
-            <a:ext cx="792088" cy="288032"/>
-          </a:xfrm>
-          <a:prstGeom prst="notchedRightArrow">
-            <a:avLst/>
-          </a:prstGeom>
-        </p:spPr>
-        <p:style>
-          <a:lnRef idx="1">
-            <a:schemeClr val="dk1"/>
-          </a:lnRef>
-          <a:fillRef idx="3">
-            <a:schemeClr val="dk1"/>
-          </a:fillRef>
-          <a:effectRef idx="2">
-            <a:schemeClr val="dk1"/>
-          </a:effectRef>
-          <a:fontRef idx="minor">
-            <a:schemeClr val="lt1"/>
-          </a:fontRef>
-        </p:style>
-        <p:txBody>
-          <a:bodyPr rtlCol="0" anchor="ctr"/>
-          <a:lstStyle/>
-          <a:p>
-            <a:pPr algn="ctr"/>
-            <a:endParaRPr lang="en-US"/>
-          </a:p>
-        </p:txBody>
-      </p:sp>
-      <p:sp>
-        <p:nvSpPr>
-          <p:cNvPr id="5" name="TextBox 4"/>
-          <p:cNvSpPr txBox="1"/>
-          <p:nvPr/>
-        </p:nvSpPr>
-        <p:spPr>
-          <a:xfrm>
-            <a:off x="588019" y="2473151"/>
-            <a:ext cx="815628" cy="307777"/>
-          </a:xfrm>
-          <a:prstGeom prst="rect">
-            <a:avLst/>
-          </a:prstGeom>
-          <a:noFill/>
-        </p:spPr>
-        <p:txBody>
-          <a:bodyPr wrap="square" rtlCol="0">
-            <a:spAutoFit/>
-          </a:bodyPr>
-          <a:lstStyle/>
-          <a:p>
-            <a:r>
-              <a:rPr lang="en-US" sz="1400" b="1" dirty="0" smtClean="0">
-                <a:latin typeface="Helvetica"/>
-                <a:cs typeface="Helvetica"/>
-              </a:rPr>
-              <a:t>TCP</a:t>
-            </a:r>
-            <a:endParaRPr lang="en-US" sz="1400" b="1" dirty="0">
-              <a:latin typeface="Helvetica"/>
-              <a:cs typeface="Helvetica"/>
-            </a:endParaRPr>
-          </a:p>
-        </p:txBody>
-      </p:sp>
-      <p:sp>
-        <p:nvSpPr>
-          <p:cNvPr id="15" name="TextBox 14"/>
-          <p:cNvSpPr txBox="1"/>
-          <p:nvPr/>
-        </p:nvSpPr>
-        <p:spPr>
-          <a:xfrm>
-            <a:off x="588019" y="2852936"/>
-            <a:ext cx="815628" cy="307777"/>
-          </a:xfrm>
-          <a:prstGeom prst="rect">
-            <a:avLst/>
-          </a:prstGeom>
-          <a:noFill/>
-        </p:spPr>
-        <p:txBody>
-          <a:bodyPr wrap="square" rtlCol="0">
-            <a:spAutoFit/>
-          </a:bodyPr>
-          <a:lstStyle/>
-          <a:p>
-            <a:r>
-              <a:rPr lang="en-US" sz="1400" b="1" dirty="0" smtClean="0">
-                <a:latin typeface="Helvetica"/>
-                <a:cs typeface="Helvetica"/>
-              </a:rPr>
-              <a:t>HTTP</a:t>
-            </a:r>
-            <a:endParaRPr lang="en-US" sz="1400" b="1" dirty="0">
-              <a:latin typeface="Helvetica"/>
-              <a:cs typeface="Helvetica"/>
-            </a:endParaRPr>
-          </a:p>
-        </p:txBody>
-      </p:sp>
-      <p:sp>
-        <p:nvSpPr>
-          <p:cNvPr id="16" name="TextBox 15"/>
-          <p:cNvSpPr txBox="1"/>
-          <p:nvPr/>
-        </p:nvSpPr>
-        <p:spPr>
-          <a:xfrm>
-            <a:off x="611559" y="3212976"/>
-            <a:ext cx="815628" cy="307777"/>
-          </a:xfrm>
-          <a:prstGeom prst="rect">
-            <a:avLst/>
-          </a:prstGeom>
-          <a:noFill/>
-        </p:spPr>
-        <p:txBody>
-          <a:bodyPr wrap="square" rtlCol="0">
-            <a:spAutoFit/>
-          </a:bodyPr>
-          <a:lstStyle/>
-          <a:p>
-            <a:r>
-              <a:rPr lang="en-US" sz="1400" b="1" dirty="0" smtClean="0">
-                <a:latin typeface="Helvetica"/>
-                <a:cs typeface="Helvetica"/>
-              </a:rPr>
-              <a:t>WS</a:t>
-            </a:r>
-            <a:endParaRPr lang="en-US" sz="1400" b="1" dirty="0">
-              <a:latin typeface="Helvetica"/>
-              <a:cs typeface="Helvetica"/>
-            </a:endParaRPr>
-          </a:p>
-        </p:txBody>
-      </p:sp>
-      <p:sp>
-        <p:nvSpPr>
           <p:cNvPr id="17" name="Notched Right Arrow 16"/>
           <p:cNvSpPr/>
           <p:nvPr/>
         </p:nvSpPr>
         <p:spPr>
           <a:xfrm rot="10800000">
-            <a:off x="1115615" y="3789040"/>
+            <a:off x="1115615" y="2852936"/>
             <a:ext cx="792088" cy="288032"/>
           </a:xfrm>
           <a:prstGeom prst="notchedRightArrow">
@@ -17674,7 +17428,7 @@
         </p:nvSpPr>
         <p:spPr>
           <a:xfrm rot="10800000">
-            <a:off x="1115615" y="4149080"/>
+            <a:off x="1115615" y="3212976"/>
             <a:ext cx="792088" cy="288032"/>
           </a:xfrm>
           <a:prstGeom prst="notchedRightArrow">
@@ -17712,7 +17466,7 @@
         </p:nvSpPr>
         <p:spPr>
           <a:xfrm rot="10800000">
-            <a:off x="1115615" y="4797152"/>
+            <a:off x="1115615" y="3861048"/>
             <a:ext cx="792088" cy="288032"/>
           </a:xfrm>
           <a:prstGeom prst="notchedRightArrow">
@@ -17750,7 +17504,7 @@
         </p:nvSpPr>
         <p:spPr>
           <a:xfrm rot="16200000">
-            <a:off x="1299265" y="4460195"/>
+            <a:off x="1299265" y="3524091"/>
             <a:ext cx="415498" cy="369332"/>
           </a:xfrm>
           <a:prstGeom prst="rect">
@@ -17780,7 +17534,7 @@
         </p:nvSpPr>
         <p:spPr>
           <a:xfrm>
-            <a:off x="539551" y="3789040"/>
+            <a:off x="539551" y="2852936"/>
             <a:ext cx="815628" cy="307777"/>
           </a:xfrm>
           <a:prstGeom prst="rect">
@@ -17816,7 +17570,7 @@
         </p:nvSpPr>
         <p:spPr>
           <a:xfrm>
-            <a:off x="611560" y="4633973"/>
+            <a:off x="611560" y="3697869"/>
             <a:ext cx="792088" cy="523220"/>
           </a:xfrm>
           <a:prstGeom prst="rect">
@@ -17861,7 +17615,7 @@
         </p:nvSpPr>
         <p:spPr>
           <a:xfrm>
-            <a:off x="539551" y="4149080"/>
+            <a:off x="539551" y="3212976"/>
             <a:ext cx="815628" cy="307777"/>
           </a:xfrm>
           <a:prstGeom prst="rect">
@@ -17897,7 +17651,7 @@
         </p:nvSpPr>
         <p:spPr>
           <a:xfrm>
-            <a:off x="4499992" y="2420888"/>
+            <a:off x="4572000" y="4797151"/>
             <a:ext cx="1296144" cy="408623"/>
           </a:xfrm>
           <a:prstGeom prst="roundRect">
@@ -17994,7 +17748,7 @@
         </p:nvSpPr>
         <p:spPr>
           <a:xfrm>
-            <a:off x="5940152" y="2420888"/>
+            <a:off x="6012160" y="4797151"/>
             <a:ext cx="1296144" cy="408623"/>
           </a:xfrm>
           <a:prstGeom prst="roundRect">
@@ -18049,7 +17803,7 @@
         </p:nvSpPr>
         <p:spPr>
           <a:xfrm>
-            <a:off x="7380312" y="2420888"/>
+            <a:off x="7452320" y="4797151"/>
             <a:ext cx="1512168" cy="408623"/>
           </a:xfrm>
           <a:prstGeom prst="roundRect">
@@ -18104,7 +17858,7 @@
         </p:nvSpPr>
         <p:spPr>
           <a:xfrm rot="10800000" flipH="1">
-            <a:off x="5364088" y="2852936"/>
+            <a:off x="5436096" y="5229199"/>
             <a:ext cx="1152128" cy="288032"/>
           </a:xfrm>
           <a:prstGeom prst="uturnArrow">
@@ -18146,7 +17900,7 @@
         </p:nvSpPr>
         <p:spPr>
           <a:xfrm rot="10800000" flipH="1">
-            <a:off x="6948264" y="2852936"/>
+            <a:off x="7020272" y="5229199"/>
             <a:ext cx="1152128" cy="288032"/>
           </a:xfrm>
           <a:prstGeom prst="uturnArrow">
@@ -19002,7 +18756,7 @@
         </p:nvSpPr>
         <p:spPr>
           <a:xfrm>
-            <a:off x="4932040" y="1907540"/>
+            <a:off x="5004048" y="4283803"/>
             <a:ext cx="3744416" cy="369332"/>
           </a:xfrm>
           <a:prstGeom prst="rect">
@@ -19069,304 +18823,9 @@
   <p:timing>
     <p:tnLst>
       <p:par>
-        <p:cTn xmlns:p14="http://schemas.microsoft.com/office/powerpoint/2010/main" id="1" dur="indefinite" restart="never" nodeType="tmRoot">
-          <p:childTnLst>
-            <p:seq concurrent="1" nextAc="seek">
-              <p:cTn id="2" dur="indefinite" nodeType="mainSeq">
-                <p:childTnLst>
-                  <p:par>
-                    <p:cTn id="3" fill="hold">
-                      <p:stCondLst>
-                        <p:cond delay="indefinite"/>
-                      </p:stCondLst>
-                      <p:childTnLst>
-                        <p:par>
-                          <p:cTn id="4" fill="hold">
-                            <p:stCondLst>
-                              <p:cond delay="0"/>
-                            </p:stCondLst>
-                            <p:childTnLst>
-                              <p:par>
-                                <p:cTn id="5" presetID="3" presetClass="entr" presetSubtype="10" fill="hold" grpId="0" nodeType="clickEffect">
-                                  <p:stCondLst>
-                                    <p:cond delay="0"/>
-                                  </p:stCondLst>
-                                  <p:childTnLst>
-                                    <p:set>
-                                      <p:cBhvr>
-                                        <p:cTn id="6" dur="1" fill="hold">
-                                          <p:stCondLst>
-                                            <p:cond delay="0"/>
-                                          </p:stCondLst>
-                                        </p:cTn>
-                                        <p:tgtEl>
-                                          <p:spTgt spid="19"/>
-                                        </p:tgtEl>
-                                        <p:attrNameLst>
-                                          <p:attrName>style.visibility</p:attrName>
-                                        </p:attrNameLst>
-                                      </p:cBhvr>
-                                      <p:to>
-                                        <p:strVal val="visible"/>
-                                      </p:to>
-                                    </p:set>
-                                    <p:animEffect transition="in" filter="blinds(horizontal)">
-                                      <p:cBhvr>
-                                        <p:cTn id="7" dur="500"/>
-                                        <p:tgtEl>
-                                          <p:spTgt spid="19"/>
-                                        </p:tgtEl>
-                                      </p:cBhvr>
-                                    </p:animEffect>
-                                  </p:childTnLst>
-                                </p:cTn>
-                              </p:par>
-                              <p:par>
-                                <p:cTn id="8" presetID="3" presetClass="entr" presetSubtype="10" fill="hold" grpId="0" nodeType="withEffect">
-                                  <p:stCondLst>
-                                    <p:cond delay="0"/>
-                                  </p:stCondLst>
-                                  <p:childTnLst>
-                                    <p:set>
-                                      <p:cBhvr>
-                                        <p:cTn id="9" dur="1" fill="hold">
-                                          <p:stCondLst>
-                                            <p:cond delay="0"/>
-                                          </p:stCondLst>
-                                        </p:cTn>
-                                        <p:tgtEl>
-                                          <p:spTgt spid="8"/>
-                                        </p:tgtEl>
-                                        <p:attrNameLst>
-                                          <p:attrName>style.visibility</p:attrName>
-                                        </p:attrNameLst>
-                                      </p:cBhvr>
-                                      <p:to>
-                                        <p:strVal val="visible"/>
-                                      </p:to>
-                                    </p:set>
-                                    <p:animEffect transition="in" filter="blinds(horizontal)">
-                                      <p:cBhvr>
-                                        <p:cTn id="10" dur="500"/>
-                                        <p:tgtEl>
-                                          <p:spTgt spid="8"/>
-                                        </p:tgtEl>
-                                      </p:cBhvr>
-                                    </p:animEffect>
-                                  </p:childTnLst>
-                                </p:cTn>
-                              </p:par>
-                              <p:par>
-                                <p:cTn id="11" presetID="3" presetClass="entr" presetSubtype="10" fill="hold" grpId="0" nodeType="withEffect">
-                                  <p:stCondLst>
-                                    <p:cond delay="0"/>
-                                  </p:stCondLst>
-                                  <p:childTnLst>
-                                    <p:set>
-                                      <p:cBhvr>
-                                        <p:cTn id="12" dur="1" fill="hold">
-                                          <p:stCondLst>
-                                            <p:cond delay="0"/>
-                                          </p:stCondLst>
-                                        </p:cTn>
-                                        <p:tgtEl>
-                                          <p:spTgt spid="22"/>
-                                        </p:tgtEl>
-                                        <p:attrNameLst>
-                                          <p:attrName>style.visibility</p:attrName>
-                                        </p:attrNameLst>
-                                      </p:cBhvr>
-                                      <p:to>
-                                        <p:strVal val="visible"/>
-                                      </p:to>
-                                    </p:set>
-                                    <p:animEffect transition="in" filter="blinds(horizontal)">
-                                      <p:cBhvr>
-                                        <p:cTn id="13" dur="500"/>
-                                        <p:tgtEl>
-                                          <p:spTgt spid="22"/>
-                                        </p:tgtEl>
-                                      </p:cBhvr>
-                                    </p:animEffect>
-                                  </p:childTnLst>
-                                </p:cTn>
-                              </p:par>
-                              <p:par>
-                                <p:cTn id="14" presetID="3" presetClass="entr" presetSubtype="10" fill="hold" grpId="0" nodeType="withEffect">
-                                  <p:stCondLst>
-                                    <p:cond delay="0"/>
-                                  </p:stCondLst>
-                                  <p:childTnLst>
-                                    <p:set>
-                                      <p:cBhvr>
-                                        <p:cTn id="15" dur="1" fill="hold">
-                                          <p:stCondLst>
-                                            <p:cond delay="0"/>
-                                          </p:stCondLst>
-                                        </p:cTn>
-                                        <p:tgtEl>
-                                          <p:spTgt spid="23"/>
-                                        </p:tgtEl>
-                                        <p:attrNameLst>
-                                          <p:attrName>style.visibility</p:attrName>
-                                        </p:attrNameLst>
-                                      </p:cBhvr>
-                                      <p:to>
-                                        <p:strVal val="visible"/>
-                                      </p:to>
-                                    </p:set>
-                                    <p:animEffect transition="in" filter="blinds(horizontal)">
-                                      <p:cBhvr>
-                                        <p:cTn id="16" dur="500"/>
-                                        <p:tgtEl>
-                                          <p:spTgt spid="23"/>
-                                        </p:tgtEl>
-                                      </p:cBhvr>
-                                    </p:animEffect>
-                                  </p:childTnLst>
-                                </p:cTn>
-                              </p:par>
-                              <p:par>
-                                <p:cTn id="17" presetID="3" presetClass="entr" presetSubtype="10" fill="hold" grpId="0" nodeType="withEffect">
-                                  <p:stCondLst>
-                                    <p:cond delay="0"/>
-                                  </p:stCondLst>
-                                  <p:childTnLst>
-                                    <p:set>
-                                      <p:cBhvr>
-                                        <p:cTn id="18" dur="1" fill="hold">
-                                          <p:stCondLst>
-                                            <p:cond delay="0"/>
-                                          </p:stCondLst>
-                                        </p:cTn>
-                                        <p:tgtEl>
-                                          <p:spTgt spid="21"/>
-                                        </p:tgtEl>
-                                        <p:attrNameLst>
-                                          <p:attrName>style.visibility</p:attrName>
-                                        </p:attrNameLst>
-                                      </p:cBhvr>
-                                      <p:to>
-                                        <p:strVal val="visible"/>
-                                      </p:to>
-                                    </p:set>
-                                    <p:animEffect transition="in" filter="blinds(horizontal)">
-                                      <p:cBhvr>
-                                        <p:cTn id="19" dur="500"/>
-                                        <p:tgtEl>
-                                          <p:spTgt spid="21"/>
-                                        </p:tgtEl>
-                                      </p:cBhvr>
-                                    </p:animEffect>
-                                  </p:childTnLst>
-                                </p:cTn>
-                              </p:par>
-                              <p:par>
-                                <p:cTn id="20" presetID="3" presetClass="entr" presetSubtype="10" fill="hold" grpId="0" nodeType="withEffect">
-                                  <p:stCondLst>
-                                    <p:cond delay="0"/>
-                                  </p:stCondLst>
-                                  <p:childTnLst>
-                                    <p:set>
-                                      <p:cBhvr>
-                                        <p:cTn id="21" dur="1" fill="hold">
-                                          <p:stCondLst>
-                                            <p:cond delay="0"/>
-                                          </p:stCondLst>
-                                        </p:cTn>
-                                        <p:tgtEl>
-                                          <p:spTgt spid="17"/>
-                                        </p:tgtEl>
-                                        <p:attrNameLst>
-                                          <p:attrName>style.visibility</p:attrName>
-                                        </p:attrNameLst>
-                                      </p:cBhvr>
-                                      <p:to>
-                                        <p:strVal val="visible"/>
-                                      </p:to>
-                                    </p:set>
-                                    <p:animEffect transition="in" filter="blinds(horizontal)">
-                                      <p:cBhvr>
-                                        <p:cTn id="22" dur="500"/>
-                                        <p:tgtEl>
-                                          <p:spTgt spid="17"/>
-                                        </p:tgtEl>
-                                      </p:cBhvr>
-                                    </p:animEffect>
-                                  </p:childTnLst>
-                                </p:cTn>
-                              </p:par>
-                              <p:par>
-                                <p:cTn id="23" presetID="3" presetClass="entr" presetSubtype="10" fill="hold" grpId="0" nodeType="withEffect">
-                                  <p:stCondLst>
-                                    <p:cond delay="0"/>
-                                  </p:stCondLst>
-                                  <p:childTnLst>
-                                    <p:set>
-                                      <p:cBhvr>
-                                        <p:cTn id="24" dur="1" fill="hold">
-                                          <p:stCondLst>
-                                            <p:cond delay="0"/>
-                                          </p:stCondLst>
-                                        </p:cTn>
-                                        <p:tgtEl>
-                                          <p:spTgt spid="18"/>
-                                        </p:tgtEl>
-                                        <p:attrNameLst>
-                                          <p:attrName>style.visibility</p:attrName>
-                                        </p:attrNameLst>
-                                      </p:cBhvr>
-                                      <p:to>
-                                        <p:strVal val="visible"/>
-                                      </p:to>
-                                    </p:set>
-                                    <p:animEffect transition="in" filter="blinds(horizontal)">
-                                      <p:cBhvr>
-                                        <p:cTn id="25" dur="500"/>
-                                        <p:tgtEl>
-                                          <p:spTgt spid="18"/>
-                                        </p:tgtEl>
-                                      </p:cBhvr>
-                                    </p:animEffect>
-                                  </p:childTnLst>
-                                </p:cTn>
-                              </p:par>
-                            </p:childTnLst>
-                          </p:cTn>
-                        </p:par>
-                      </p:childTnLst>
-                    </p:cTn>
-                  </p:par>
-                </p:childTnLst>
-              </p:cTn>
-              <p:prevCondLst>
-                <p:cond evt="onPrev" delay="0">
-                  <p:tgtEl>
-                    <p:sldTgt/>
-                  </p:tgtEl>
-                </p:cond>
-              </p:prevCondLst>
-              <p:nextCondLst>
-                <p:cond evt="onNext" delay="0">
-                  <p:tgtEl>
-                    <p:sldTgt/>
-                  </p:tgtEl>
-                </p:cond>
-              </p:nextCondLst>
-            </p:seq>
-          </p:childTnLst>
-        </p:cTn>
+        <p:cTn xmlns:p14="http://schemas.microsoft.com/office/powerpoint/2010/main" id="1" dur="indefinite" restart="never" nodeType="tmRoot"/>
       </p:par>
     </p:tnLst>
-    <p:bldLst>
-      <p:bldP spid="17" grpId="0" animBg="1"/>
-      <p:bldP spid="18" grpId="0" animBg="1"/>
-      <p:bldP spid="19" grpId="0" animBg="1"/>
-      <p:bldP spid="8" grpId="0"/>
-      <p:bldP spid="21" grpId="0"/>
-      <p:bldP spid="22" grpId="0"/>
-      <p:bldP spid="23" grpId="0"/>
-    </p:bldLst>
   </p:timing>
 </p:sld>
 </file>
@@ -21079,7 +20538,7 @@
         <p:spPr>
           <a:xfrm>
             <a:off x="611560" y="5333727"/>
-            <a:ext cx="7865855" cy="615553"/>
+            <a:ext cx="8219417" cy="615553"/>
           </a:xfrm>
           <a:prstGeom prst="rect">
             <a:avLst/>
@@ -21098,7 +20557,11 @@
             </a:r>
             <a:r>
               <a:rPr lang="en-US" sz="1600" dirty="0"/>
-              <a:t>Producer API: </a:t>
+              <a:t>Producer </a:t>
+            </a:r>
+            <a:r>
+              <a:rPr lang="en-US" sz="1600" dirty="0" smtClean="0"/>
+              <a:t>Module: </a:t>
             </a:r>
             <a:r>
               <a:rPr lang="en-US" sz="1600" dirty="0">
@@ -24886,7 +24349,7 @@
         <p:spPr>
           <a:xfrm>
             <a:off x="755576" y="1617118"/>
-            <a:ext cx="7848872" cy="3828106"/>
+            <a:ext cx="7920880" cy="3396058"/>
           </a:xfrm>
           <a:prstGeom prst="roundRect">
             <a:avLst/>
@@ -25429,7 +24892,7 @@
         </p:nvSpPr>
         <p:spPr>
           <a:xfrm>
-            <a:off x="1403648" y="4296394"/>
+            <a:off x="1403648" y="3861048"/>
             <a:ext cx="2232248" cy="936104"/>
           </a:xfrm>
           <a:prstGeom prst="roundRect">
@@ -25472,7 +24935,7 @@
         </p:nvSpPr>
         <p:spPr>
           <a:xfrm>
-            <a:off x="1259632" y="4080370"/>
+            <a:off x="1259632" y="3645024"/>
             <a:ext cx="2232248" cy="936104"/>
           </a:xfrm>
           <a:prstGeom prst="roundRect">
@@ -25515,7 +24978,7 @@
         </p:nvSpPr>
         <p:spPr>
           <a:xfrm>
-            <a:off x="1115616" y="3864346"/>
+            <a:off x="1115616" y="3429000"/>
             <a:ext cx="2232248" cy="936104"/>
           </a:xfrm>
           <a:prstGeom prst="roundRect">
@@ -25572,7 +25035,7 @@
         </p:blipFill>
         <p:spPr>
           <a:xfrm>
-            <a:off x="1259632" y="3936354"/>
+            <a:off x="1259632" y="3501008"/>
             <a:ext cx="1968500" cy="805295"/>
           </a:xfrm>
           <a:prstGeom prst="rect">
@@ -25655,7 +25118,7 @@
         </p:nvCxnSpPr>
         <p:spPr>
           <a:xfrm flipV="1">
-            <a:off x="3635896" y="3789040"/>
+            <a:off x="3635896" y="3353694"/>
             <a:ext cx="2376264" cy="975406"/>
           </a:xfrm>
           <a:prstGeom prst="straightConnector1">
@@ -25688,7 +25151,7 @@
         </p:nvSpPr>
         <p:spPr>
           <a:xfrm rot="20395945">
-            <a:off x="4237442" y="4320004"/>
+            <a:off x="4237442" y="3919924"/>
             <a:ext cx="1247944" cy="369332"/>
           </a:xfrm>
           <a:prstGeom prst="rect">
@@ -26287,7 +25750,7 @@
         <p:spPr>
           <a:xfrm flipV="1">
             <a:off x="2339752" y="2708920"/>
-            <a:ext cx="0" cy="1155427"/>
+            <a:ext cx="0" cy="651372"/>
           </a:xfrm>
           <a:prstGeom prst="straightConnector1">
             <a:avLst/>
@@ -26319,7 +25782,7 @@
         </p:nvSpPr>
         <p:spPr>
           <a:xfrm>
-            <a:off x="2408416" y="3275692"/>
+            <a:off x="2267744" y="2996952"/>
             <a:ext cx="939448" cy="369332"/>
           </a:xfrm>
           <a:prstGeom prst="rect">
@@ -26404,6 +25867,69 @@
               <a:latin typeface="Helvetica"/>
               <a:cs typeface="Helvetica"/>
             </a:endParaRPr>
+          </a:p>
+        </p:txBody>
+      </p:sp>
+      <p:sp>
+        <p:nvSpPr>
+          <p:cNvPr id="10" name="TextBox 9"/>
+          <p:cNvSpPr txBox="1"/>
+          <p:nvPr/>
+        </p:nvSpPr>
+        <p:spPr>
+          <a:xfrm>
+            <a:off x="293378" y="5261719"/>
+            <a:ext cx="8880656" cy="615553"/>
+          </a:xfrm>
+          <a:prstGeom prst="rect">
+            <a:avLst/>
+          </a:prstGeom>
+          <a:noFill/>
+        </p:spPr>
+        <p:txBody>
+          <a:bodyPr wrap="none" rtlCol="0">
+            <a:spAutoFit/>
+          </a:bodyPr>
+          <a:lstStyle/>
+          <a:p>
+            <a:r>
+              <a:rPr lang="en-US" sz="1600" dirty="0" smtClean="0"/>
+              <a:t>Perl </a:t>
+            </a:r>
+            <a:r>
+              <a:rPr lang="en-US" sz="1600" dirty="0" smtClean="0"/>
+              <a:t>Module </a:t>
+            </a:r>
+            <a:r>
+              <a:rPr lang="en-US" sz="1600" dirty="0"/>
+              <a:t>for Cassandra</a:t>
+            </a:r>
+            <a:r>
+              <a:rPr lang="en-US" sz="1600" dirty="0" smtClean="0"/>
+              <a:t>: </a:t>
+            </a:r>
+            <a:r>
+              <a:rPr lang="en-US" sz="1600" dirty="0" smtClean="0">
+                <a:hlinkClick r:id="rId5"/>
+              </a:rPr>
+              <a:t>http</a:t>
+            </a:r>
+            <a:r>
+              <a:rPr lang="en-US" sz="1600" dirty="0">
+                <a:hlinkClick r:id="rId5"/>
+              </a:rPr>
+              <a:t>://search.cpan.org/~mkjellman/perlcassa-0.041/lib/</a:t>
+            </a:r>
+            <a:r>
+              <a:rPr lang="en-US" sz="1600" dirty="0" smtClean="0">
+                <a:hlinkClick r:id="rId5"/>
+              </a:rPr>
+              <a:t>perlcassa.pm</a:t>
+            </a:r>
+            <a:endParaRPr lang="en-US" sz="1600" dirty="0" smtClean="0"/>
+          </a:p>
+          <a:p>
+            <a:endParaRPr lang="en-US" dirty="0"/>
           </a:p>
         </p:txBody>
       </p:sp>

</xml_diff>